<commit_message>
add work of solving cpu error
</commit_message>
<xml_diff>
--- a/ppt/2022-5-21.pptx
+++ b/ppt/2022-5-21.pptx
@@ -268,7 +268,7 @@
           <a:p>
             <a:fld id="{DE75668F-B37B-164D-A62C-3FF5A8BC808F}" type="datetimeFigureOut">
               <a:rPr lang="en-US" smtClean="0"/>
-              <a:t>5/20/22</a:t>
+              <a:t>5/21/22</a:t>
             </a:fld>
             <a:endParaRPr lang="en-US"/>
           </a:p>
@@ -1622,7 +1622,7 @@
           <a:p>
             <a:fld id="{CE875574-B30F-E946-8A30-5D40B09C42BE}" type="datetimeFigureOut">
               <a:rPr lang="en-US" smtClean="0"/>
-              <a:t>5/20/22</a:t>
+              <a:t>5/21/22</a:t>
             </a:fld>
             <a:endParaRPr lang="en-US"/>
           </a:p>
@@ -1787,7 +1787,7 @@
           <a:p>
             <a:fld id="{CE875574-B30F-E946-8A30-5D40B09C42BE}" type="datetimeFigureOut">
               <a:rPr lang="en-US" smtClean="0"/>
-              <a:t>5/20/22</a:t>
+              <a:t>5/21/22</a:t>
             </a:fld>
             <a:endParaRPr lang="en-US"/>
           </a:p>
@@ -1962,7 +1962,7 @@
           <a:p>
             <a:fld id="{CE875574-B30F-E946-8A30-5D40B09C42BE}" type="datetimeFigureOut">
               <a:rPr lang="en-US" smtClean="0"/>
-              <a:t>5/20/22</a:t>
+              <a:t>5/21/22</a:t>
             </a:fld>
             <a:endParaRPr lang="en-US"/>
           </a:p>
@@ -2202,7 +2202,7 @@
           <a:p>
             <a:fld id="{CE875574-B30F-E946-8A30-5D40B09C42BE}" type="datetimeFigureOut">
               <a:rPr lang="en-US" smtClean="0"/>
-              <a:t>5/20/22</a:t>
+              <a:t>5/21/22</a:t>
             </a:fld>
             <a:endParaRPr lang="en-US"/>
           </a:p>
@@ -2443,7 +2443,7 @@
           <a:p>
             <a:fld id="{CE875574-B30F-E946-8A30-5D40B09C42BE}" type="datetimeFigureOut">
               <a:rPr lang="en-US" smtClean="0"/>
-              <a:t>5/20/22</a:t>
+              <a:t>5/21/22</a:t>
             </a:fld>
             <a:endParaRPr lang="en-US"/>
           </a:p>
@@ -2670,7 +2670,7 @@
           <a:p>
             <a:fld id="{CE875574-B30F-E946-8A30-5D40B09C42BE}" type="datetimeFigureOut">
               <a:rPr lang="en-US" smtClean="0"/>
-              <a:t>5/20/22</a:t>
+              <a:t>5/21/22</a:t>
             </a:fld>
             <a:endParaRPr lang="en-US"/>
           </a:p>
@@ -3032,7 +3032,7 @@
           <a:p>
             <a:fld id="{CE875574-B30F-E946-8A30-5D40B09C42BE}" type="datetimeFigureOut">
               <a:rPr lang="en-US" smtClean="0"/>
-              <a:t>5/20/22</a:t>
+              <a:t>5/21/22</a:t>
             </a:fld>
             <a:endParaRPr lang="en-US"/>
           </a:p>
@@ -3145,7 +3145,7 @@
           <a:p>
             <a:fld id="{CE875574-B30F-E946-8A30-5D40B09C42BE}" type="datetimeFigureOut">
               <a:rPr lang="en-US" smtClean="0"/>
-              <a:t>5/20/22</a:t>
+              <a:t>5/21/22</a:t>
             </a:fld>
             <a:endParaRPr lang="en-US"/>
           </a:p>
@@ -3235,7 +3235,7 @@
           <a:p>
             <a:fld id="{CE875574-B30F-E946-8A30-5D40B09C42BE}" type="datetimeFigureOut">
               <a:rPr lang="en-US" smtClean="0"/>
-              <a:t>5/20/22</a:t>
+              <a:t>5/21/22</a:t>
             </a:fld>
             <a:endParaRPr lang="en-US"/>
           </a:p>
@@ -3507,7 +3507,7 @@
           <a:p>
             <a:fld id="{CE875574-B30F-E946-8A30-5D40B09C42BE}" type="datetimeFigureOut">
               <a:rPr lang="en-US" smtClean="0"/>
-              <a:t>5/20/22</a:t>
+              <a:t>5/21/22</a:t>
             </a:fld>
             <a:endParaRPr lang="en-US"/>
           </a:p>
@@ -3759,7 +3759,7 @@
           <a:p>
             <a:fld id="{CE875574-B30F-E946-8A30-5D40B09C42BE}" type="datetimeFigureOut">
               <a:rPr lang="en-US" smtClean="0"/>
-              <a:t>5/20/22</a:t>
+              <a:t>5/21/22</a:t>
             </a:fld>
             <a:endParaRPr lang="en-US"/>
           </a:p>
@@ -3967,7 +3967,7 @@
           <a:p>
             <a:fld id="{CE875574-B30F-E946-8A30-5D40B09C42BE}" type="datetimeFigureOut">
               <a:rPr lang="en-US" smtClean="0"/>
-              <a:t>5/20/22</a:t>
+              <a:t>5/21/22</a:t>
             </a:fld>
             <a:endParaRPr lang="en-US"/>
           </a:p>
@@ -7990,7 +7990,7 @@
         </p:blipFill>
         <p:spPr>
           <a:xfrm>
-            <a:off x="1317060" y="5203089"/>
+            <a:off x="1317060" y="5197163"/>
             <a:ext cx="3575597" cy="419671"/>
           </a:xfrm>
           <a:prstGeom prst="rect">

</xml_diff>